<commit_message>
updated from my side
</commit_message>
<xml_diff>
--- a/TeamProjectPPT updated.pptx
+++ b/TeamProjectPPT updated.pptx
@@ -13,15 +13,16 @@
     <p:sldId id="261" r:id="rId7"/>
     <p:sldId id="267" r:id="rId8"/>
     <p:sldId id="262" r:id="rId9"/>
-    <p:sldId id="264" r:id="rId10"/>
-    <p:sldId id="265" r:id="rId11"/>
-    <p:sldId id="266" r:id="rId12"/>
-    <p:sldId id="271" r:id="rId13"/>
-    <p:sldId id="276" r:id="rId14"/>
-    <p:sldId id="277" r:id="rId15"/>
-    <p:sldId id="278" r:id="rId16"/>
-    <p:sldId id="273" r:id="rId17"/>
-    <p:sldId id="274" r:id="rId18"/>
+    <p:sldId id="279" r:id="rId10"/>
+    <p:sldId id="280" r:id="rId11"/>
+    <p:sldId id="265" r:id="rId12"/>
+    <p:sldId id="266" r:id="rId13"/>
+    <p:sldId id="271" r:id="rId14"/>
+    <p:sldId id="276" r:id="rId15"/>
+    <p:sldId id="277" r:id="rId16"/>
+    <p:sldId id="278" r:id="rId17"/>
+    <p:sldId id="273" r:id="rId18"/>
+    <p:sldId id="274" r:id="rId19"/>
   </p:sldIdLst>
   <p:sldSz cx="12192000" cy="6858000"/>
   <p:notesSz cx="6858000" cy="9144000"/>
@@ -293,7 +294,7 @@
             <a:fld id="{276D79ED-3FA7-4EF8-964B-EB8BCFAB02F8}" type="datetimeFigureOut">
               <a:rPr lang="en-US" smtClean="0"/>
               <a:pPr/>
-              <a:t>5/10/2022</a:t>
+              <a:t>5/11/22</a:t>
             </a:fld>
             <a:endParaRPr lang="en-US"/>
           </a:p>
@@ -539,7 +540,7 @@
           <a:p>
             <a:fld id="{276D79ED-3FA7-4EF8-964B-EB8BCFAB02F8}" type="datetimeFigureOut">
               <a:rPr lang="en-US" smtClean="0"/>
-              <a:t>5/10/2022</a:t>
+              <a:t>5/11/22</a:t>
             </a:fld>
             <a:endParaRPr lang="en-US"/>
           </a:p>
@@ -816,7 +817,7 @@
           <a:p>
             <a:fld id="{276D79ED-3FA7-4EF8-964B-EB8BCFAB02F8}" type="datetimeFigureOut">
               <a:rPr lang="en-US" smtClean="0"/>
-              <a:t>5/10/2022</a:t>
+              <a:t>5/11/22</a:t>
             </a:fld>
             <a:endParaRPr lang="en-US"/>
           </a:p>
@@ -1057,7 +1058,7 @@
           <a:p>
             <a:fld id="{276D79ED-3FA7-4EF8-964B-EB8BCFAB02F8}" type="datetimeFigureOut">
               <a:rPr lang="en-US" smtClean="0"/>
-              <a:t>5/10/2022</a:t>
+              <a:t>5/11/22</a:t>
             </a:fld>
             <a:endParaRPr lang="en-US"/>
           </a:p>
@@ -1421,7 +1422,7 @@
           <a:p>
             <a:fld id="{276D79ED-3FA7-4EF8-964B-EB8BCFAB02F8}" type="datetimeFigureOut">
               <a:rPr lang="en-US" smtClean="0"/>
-              <a:t>5/10/2022</a:t>
+              <a:t>5/11/22</a:t>
             </a:fld>
             <a:endParaRPr lang="en-US"/>
           </a:p>
@@ -1538,7 +1539,7 @@
           <a:p>
             <a:fld id="{276D79ED-3FA7-4EF8-964B-EB8BCFAB02F8}" type="datetimeFigureOut">
               <a:rPr lang="en-US" smtClean="0"/>
-              <a:t>5/10/2022</a:t>
+              <a:t>5/11/22</a:t>
             </a:fld>
             <a:endParaRPr lang="en-US"/>
           </a:p>
@@ -1633,7 +1634,7 @@
           <a:p>
             <a:fld id="{276D79ED-3FA7-4EF8-964B-EB8BCFAB02F8}" type="datetimeFigureOut">
               <a:rPr lang="en-US" smtClean="0"/>
-              <a:t>5/10/2022</a:t>
+              <a:t>5/11/22</a:t>
             </a:fld>
             <a:endParaRPr lang="en-US"/>
           </a:p>
@@ -1909,7 +1910,7 @@
           <a:p>
             <a:fld id="{276D79ED-3FA7-4EF8-964B-EB8BCFAB02F8}" type="datetimeFigureOut">
               <a:rPr lang="en-US" smtClean="0"/>
-              <a:t>5/10/2022</a:t>
+              <a:t>5/11/22</a:t>
             </a:fld>
             <a:endParaRPr lang="en-US"/>
           </a:p>
@@ -2165,7 +2166,7 @@
           <a:p>
             <a:fld id="{276D79ED-3FA7-4EF8-964B-EB8BCFAB02F8}" type="datetimeFigureOut">
               <a:rPr lang="en-US" smtClean="0"/>
-              <a:t>5/10/2022</a:t>
+              <a:t>5/11/22</a:t>
             </a:fld>
             <a:endParaRPr lang="en-US"/>
           </a:p>
@@ -2389,7 +2390,7 @@
             <a:fld id="{276D79ED-3FA7-4EF8-964B-EB8BCFAB02F8}" type="datetimeFigureOut">
               <a:rPr lang="en-US" smtClean="0"/>
               <a:pPr/>
-              <a:t>5/10/2022</a:t>
+              <a:t>5/11/22</a:t>
             </a:fld>
             <a:endParaRPr lang="en-US"/>
           </a:p>
@@ -3001,7 +3002,7 @@
         </p:spPr>
         <p:txBody>
           <a:bodyPr>
-            <a:normAutofit/>
+            <a:normAutofit fontScale="90000"/>
           </a:bodyPr>
           <a:lstStyle/>
           <a:p>
@@ -3142,7 +3143,13 @@
       </p:grpSpPr>
       <p:pic>
         <p:nvPicPr>
-          <p:cNvPr id="5" name="Picture 4"/>
+          <p:cNvPr id="3" name="Picture 2" descr="Chart, funnel chart&#10;&#10;Description automatically generated">
+            <a:extLst>
+              <a:ext uri="{FF2B5EF4-FFF2-40B4-BE49-F238E27FC236}">
+                <a16:creationId xmlns:a16="http://schemas.microsoft.com/office/drawing/2014/main" id="{4B351F1F-F58B-CD46-BA09-147BEBE44AE4}"/>
+              </a:ext>
+            </a:extLst>
+          </p:cNvPr>
           <p:cNvPicPr>
             <a:picLocks noChangeAspect="1"/>
           </p:cNvPicPr>
@@ -3162,54 +3169,30 @@
         </p:blipFill>
         <p:spPr>
           <a:xfrm>
-            <a:off x="332642" y="1035656"/>
-            <a:ext cx="6426654" cy="2906468"/>
+            <a:off x="85913" y="834851"/>
+            <a:ext cx="8214104" cy="6030989"/>
           </a:xfrm>
           <a:prstGeom prst="rect">
             <a:avLst/>
           </a:prstGeom>
         </p:spPr>
       </p:pic>
-      <p:pic>
-        <p:nvPicPr>
-          <p:cNvPr id="6" name="Picture 5"/>
-          <p:cNvPicPr>
-            <a:picLocks noChangeAspect="1"/>
-          </p:cNvPicPr>
-          <p:nvPr/>
-        </p:nvPicPr>
-        <p:blipFill>
-          <a:blip r:embed="rId3">
+      <p:sp>
+        <p:nvSpPr>
+          <p:cNvPr id="4" name="TextBox 3">
             <a:extLst>
-              <a:ext uri="{28A0092B-C50C-407E-A947-70E740481C1C}">
-                <a14:useLocalDpi xmlns:a14="http://schemas.microsoft.com/office/drawing/2010/main" val="0"/>
+              <a:ext uri="{FF2B5EF4-FFF2-40B4-BE49-F238E27FC236}">
+                <a16:creationId xmlns:a16="http://schemas.microsoft.com/office/drawing/2014/main" id="{AABFC1C5-50C2-654C-B8A5-EB43D02BC07D}"/>
               </a:ext>
             </a:extLst>
-          </a:blip>
-          <a:stretch>
-            <a:fillRect/>
-          </a:stretch>
-        </p:blipFill>
-        <p:spPr>
-          <a:xfrm>
-            <a:off x="545718" y="4062309"/>
-            <a:ext cx="6338408" cy="2795691"/>
-          </a:xfrm>
-          <a:prstGeom prst="rect">
-            <a:avLst/>
-          </a:prstGeom>
-        </p:spPr>
-      </p:pic>
-      <p:sp>
-        <p:nvSpPr>
-          <p:cNvPr id="9" name="TextBox 8"/>
+          </p:cNvPr>
           <p:cNvSpPr txBox="1"/>
           <p:nvPr/>
         </p:nvSpPr>
         <p:spPr>
           <a:xfrm>
-            <a:off x="7235107" y="1568727"/>
-            <a:ext cx="4624251" cy="3139321"/>
+            <a:off x="371957" y="126965"/>
+            <a:ext cx="8214103" cy="707886"/>
           </a:xfrm>
           <a:prstGeom prst="rect">
             <a:avLst/>
@@ -3223,9 +3206,70 @@
           <a:lstStyle/>
           <a:p>
             <a:r>
-              <a:rPr lang="en-US" b="1" dirty="0"/>
-              <a:t>Popularity by Type During the Pandemic-Q2/2020 vs. Q2/2021</a:t>
-            </a:r>
+              <a:rPr lang="en-US" sz="2000" b="1" dirty="0">
+                <a:latin typeface="Open Sans" panose="020B0606030504020204" pitchFamily="34" charset="0"/>
+                <a:ea typeface="Open Sans" panose="020B0606030504020204" pitchFamily="34" charset="0"/>
+                <a:cs typeface="Open Sans" panose="020B0606030504020204" pitchFamily="34" charset="0"/>
+              </a:rPr>
+              <a:t>What are the top genres distributed by Netflix for tv shows in the last three years (2019, 2020, 2021)?</a:t>
+            </a:r>
+          </a:p>
+        </p:txBody>
+      </p:sp>
+      <p:sp>
+        <p:nvSpPr>
+          <p:cNvPr id="5" name="Rectangle 4">
+            <a:extLst>
+              <a:ext uri="{FF2B5EF4-FFF2-40B4-BE49-F238E27FC236}">
+                <a16:creationId xmlns:a16="http://schemas.microsoft.com/office/drawing/2014/main" id="{FCFADC40-613F-A64F-8AC1-63A8C1F27AD3}"/>
+              </a:ext>
+            </a:extLst>
+          </p:cNvPr>
+          <p:cNvSpPr/>
+          <p:nvPr/>
+        </p:nvSpPr>
+        <p:spPr>
+          <a:xfrm>
+            <a:off x="8471760" y="1005260"/>
+            <a:ext cx="3605938" cy="2423740"/>
+          </a:xfrm>
+          <a:prstGeom prst="rect">
+            <a:avLst/>
+          </a:prstGeom>
+        </p:spPr>
+        <p:txBody>
+          <a:bodyPr wrap="square">
+            <a:spAutoFit/>
+          </a:bodyPr>
+          <a:lstStyle/>
+          <a:p>
+            <a:pPr marL="285750" indent="-285750">
+              <a:spcAft>
+                <a:spcPts val="900"/>
+              </a:spcAft>
+              <a:buFont typeface="Arial" panose="020B0604020202020204" pitchFamily="34" charset="0"/>
+              <a:buChar char="•"/>
+            </a:pPr>
+            <a:r>
+              <a:rPr lang="en-US" dirty="0">
+                <a:latin typeface="Arial" panose="020B0604020202020204" pitchFamily="34" charset="0"/>
+                <a:ea typeface="Times New Roman" panose="02020603050405020304" pitchFamily="18" charset="0"/>
+              </a:rPr>
+              <a:t>Netflix offers range of tv show genres and most of the content have multiple genres. </a:t>
+            </a:r>
+            <a:r>
+              <a:rPr lang="en-US" dirty="0">
+                <a:latin typeface="Arial" panose="020B0604020202020204" pitchFamily="34" charset="0"/>
+                <a:ea typeface="Times New Roman" panose="02020603050405020304" pitchFamily="18" charset="0"/>
+                <a:cs typeface="Times New Roman" panose="02020603050405020304" pitchFamily="18" charset="0"/>
+              </a:rPr>
+              <a:t> </a:t>
+            </a:r>
+            <a:endParaRPr lang="en-US" sz="2400" dirty="0">
+              <a:latin typeface="Calibri" panose="020F0502020204030204" pitchFamily="34" charset="0"/>
+              <a:ea typeface="Calibri" panose="020F0502020204030204" pitchFamily="34" charset="0"/>
+              <a:cs typeface="Times New Roman" panose="02020603050405020304" pitchFamily="18" charset="0"/>
+            </a:endParaRPr>
           </a:p>
           <a:p>
             <a:pPr marL="285750" indent="-285750">
@@ -3233,65 +3277,36 @@
               <a:buChar char="•"/>
             </a:pPr>
             <a:r>
-              <a:rPr lang="en-US" dirty="0"/>
-              <a:t>Compare the results between the two quarters</a:t>
-            </a:r>
-          </a:p>
-          <a:p>
-            <a:pPr marL="285750" indent="-285750">
-              <a:buFont typeface="Arial" panose="020B0604020202020204" pitchFamily="34" charset="0"/>
-              <a:buChar char="•"/>
-            </a:pPr>
-            <a:r>
-              <a:rPr lang="en-US" dirty="0"/>
-              <a:t>Netflix Exclusive TV shows and Non-Exclusive Movies-both dropped in popularity.</a:t>
-            </a:r>
-          </a:p>
-          <a:p>
-            <a:pPr marL="285750" indent="-285750">
-              <a:buFont typeface="Arial" panose="020B0604020202020204" pitchFamily="34" charset="0"/>
-              <a:buChar char="•"/>
-            </a:pPr>
-            <a:r>
-              <a:rPr lang="en-US" dirty="0"/>
-              <a:t>We could see that Netflix Exclusive movies increased over the same time period along with Non-Exclusive TV shows.</a:t>
-            </a:r>
-          </a:p>
-        </p:txBody>
-      </p:sp>
-      <p:sp>
-        <p:nvSpPr>
-          <p:cNvPr id="11" name="TextBox 10"/>
-          <p:cNvSpPr txBox="1"/>
-          <p:nvPr/>
-        </p:nvSpPr>
-        <p:spPr>
-          <a:xfrm>
-            <a:off x="207812" y="155333"/>
-            <a:ext cx="6426654" cy="707886"/>
-          </a:xfrm>
-          <a:prstGeom prst="rect">
-            <a:avLst/>
-          </a:prstGeom>
-          <a:noFill/>
-        </p:spPr>
-        <p:txBody>
-          <a:bodyPr wrap="square" rtlCol="0">
-            <a:spAutoFit/>
-          </a:bodyPr>
-          <a:lstStyle/>
-          <a:p>
-            <a:r>
-              <a:rPr lang="en-US" sz="2000" b="1" dirty="0"/>
-              <a:t>What was the popular type of entertainment on Netflix during the pandemic?</a:t>
-            </a:r>
+              <a:rPr lang="en-US" dirty="0">
+                <a:solidFill>
+                  <a:srgbClr val="000000"/>
+                </a:solidFill>
+                <a:latin typeface="Arial" panose="020B0604020202020204" pitchFamily="34" charset="0"/>
+                <a:ea typeface="Times New Roman" panose="02020603050405020304" pitchFamily="18" charset="0"/>
+                <a:cs typeface="Times New Roman" panose="02020603050405020304" pitchFamily="18" charset="0"/>
+              </a:rPr>
+              <a:t>It is clear that tv show contents is dominated by kids’ tv genre followed by international tv shows which is tied with tv dramas. </a:t>
+            </a:r>
+            <a:r>
+              <a:rPr lang="en-US" dirty="0">
+                <a:latin typeface="Arial" panose="020B0604020202020204" pitchFamily="34" charset="0"/>
+                <a:ea typeface="Times New Roman" panose="02020603050405020304" pitchFamily="18" charset="0"/>
+                <a:cs typeface="Times New Roman" panose="02020603050405020304" pitchFamily="18" charset="0"/>
+              </a:rPr>
+              <a:t> </a:t>
+            </a:r>
+            <a:endParaRPr lang="en-US" sz="2400" dirty="0">
+              <a:latin typeface="Calibri" panose="020F0502020204030204" pitchFamily="34" charset="0"/>
+              <a:ea typeface="Calibri" panose="020F0502020204030204" pitchFamily="34" charset="0"/>
+              <a:cs typeface="Times New Roman" panose="02020603050405020304" pitchFamily="18" charset="0"/>
+            </a:endParaRPr>
           </a:p>
         </p:txBody>
       </p:sp>
     </p:spTree>
     <p:extLst>
       <p:ext uri="{BB962C8B-B14F-4D97-AF65-F5344CB8AC3E}">
-        <p14:creationId xmlns:p14="http://schemas.microsoft.com/office/powerpoint/2010/main" val="475535063"/>
+        <p14:creationId xmlns:p14="http://schemas.microsoft.com/office/powerpoint/2010/main" val="243744400"/>
       </p:ext>
     </p:extLst>
   </p:cSld>
@@ -3340,8 +3355,8 @@
         </p:blipFill>
         <p:spPr>
           <a:xfrm>
-            <a:off x="103409" y="1007659"/>
-            <a:ext cx="6767655" cy="3030583"/>
+            <a:off x="332642" y="1035656"/>
+            <a:ext cx="6426654" cy="2906468"/>
           </a:xfrm>
           <a:prstGeom prst="rect">
             <a:avLst/>
@@ -3350,7 +3365,7 @@
       </p:pic>
       <p:pic>
         <p:nvPicPr>
-          <p:cNvPr id="8" name="Picture 7"/>
+          <p:cNvPr id="6" name="Picture 5"/>
           <p:cNvPicPr>
             <a:picLocks noChangeAspect="1"/>
           </p:cNvPicPr>
@@ -3370,8 +3385,8 @@
         </p:blipFill>
         <p:spPr>
           <a:xfrm>
-            <a:off x="369507" y="4101738"/>
-            <a:ext cx="6028637" cy="2756262"/>
+            <a:off x="545718" y="4062309"/>
+            <a:ext cx="6338408" cy="2795691"/>
           </a:xfrm>
           <a:prstGeom prst="rect">
             <a:avLst/>
@@ -3386,8 +3401,8 @@
         </p:nvSpPr>
         <p:spPr>
           <a:xfrm>
-            <a:off x="7026047" y="509276"/>
-            <a:ext cx="4624251" cy="4801314"/>
+            <a:off x="7235107" y="1568727"/>
+            <a:ext cx="4624251" cy="3139321"/>
           </a:xfrm>
           <a:prstGeom prst="rect">
             <a:avLst/>
@@ -3402,9 +3417,8 @@
           <a:p>
             <a:r>
               <a:rPr lang="en-US" b="1" dirty="0"/>
-              <a:t>Popularity by Type During the Pandemic-Q4/2020 vs. Q4/2021</a:t>
-            </a:r>
-            <a:endParaRPr lang="en-US" dirty="0"/>
+              <a:t>Popularity by Type During the Pandemic-Q2/2020 vs. Q2/2021</a:t>
+            </a:r>
           </a:p>
           <a:p>
             <a:pPr marL="285750" indent="-285750">
@@ -3413,7 +3427,7 @@
             </a:pPr>
             <a:r>
               <a:rPr lang="en-US" dirty="0"/>
-              <a:t>Compare the results between the two quarters.</a:t>
+              <a:t>Compare the results between the two quarters</a:t>
             </a:r>
           </a:p>
           <a:p>
@@ -3423,15 +3437,7 @@
             </a:pPr>
             <a:r>
               <a:rPr lang="en-US" dirty="0"/>
-              <a:t>Netflix Exclusive TV shows increased a lot bringing it back to the around the same level as the 2</a:t>
-            </a:r>
-            <a:r>
-              <a:rPr lang="en-US" baseline="30000" dirty="0"/>
-              <a:t>nd</a:t>
-            </a:r>
-            <a:r>
-              <a:rPr lang="en-US" dirty="0"/>
-              <a:t> quarter of 2020. </a:t>
+              <a:t>Netflix Exclusive TV shows and Non-Exclusive Movies-both dropped in popularity.</a:t>
             </a:r>
           </a:p>
           <a:p>
@@ -3441,24 +3447,14 @@
             </a:pPr>
             <a:r>
               <a:rPr lang="en-US" dirty="0"/>
-              <a:t>We could see that Netflix Exclusive movies actually increased slightly over the same time period but the non-exclusive movies and TV shows remained around the same or decreased.</a:t>
-            </a:r>
-          </a:p>
-          <a:p>
-            <a:pPr marL="285750" indent="-285750">
-              <a:buFont typeface="Arial" panose="020B0604020202020204" pitchFamily="34" charset="0"/>
-              <a:buChar char="•"/>
-            </a:pPr>
-            <a:r>
-              <a:rPr lang="en-US" dirty="0"/>
-              <a:t>Throughout the timeframe, we could see a small number of comedy specials in the daily Top 10 that resulted no more than 1-2% per quarter.</a:t>
-            </a:r>
-          </a:p>
-        </p:txBody>
-      </p:sp>
-      <p:sp>
-        <p:nvSpPr>
-          <p:cNvPr id="10" name="TextBox 9"/>
+              <a:t>We could see that Netflix Exclusive movies increased over the same time period along with Non-Exclusive TV shows.</a:t>
+            </a:r>
+          </a:p>
+        </p:txBody>
+      </p:sp>
+      <p:sp>
+        <p:nvSpPr>
+          <p:cNvPr id="11" name="TextBox 10"/>
           <p:cNvSpPr txBox="1"/>
           <p:nvPr/>
         </p:nvSpPr>
@@ -3488,7 +3484,7 @@
     </p:spTree>
     <p:extLst>
       <p:ext uri="{BB962C8B-B14F-4D97-AF65-F5344CB8AC3E}">
-        <p14:creationId xmlns:p14="http://schemas.microsoft.com/office/powerpoint/2010/main" val="792271978"/>
+        <p14:creationId xmlns:p14="http://schemas.microsoft.com/office/powerpoint/2010/main" val="475535063"/>
       </p:ext>
     </p:extLst>
   </p:cSld>
@@ -3515,16 +3511,76 @@
           <a:chExt cx="0" cy="0"/>
         </a:xfrm>
       </p:grpSpPr>
-      <p:sp>
-        <p:nvSpPr>
-          <p:cNvPr id="2" name="TextBox 1"/>
+      <p:pic>
+        <p:nvPicPr>
+          <p:cNvPr id="5" name="Picture 4"/>
+          <p:cNvPicPr>
+            <a:picLocks noChangeAspect="1"/>
+          </p:cNvPicPr>
+          <p:nvPr/>
+        </p:nvPicPr>
+        <p:blipFill>
+          <a:blip r:embed="rId2">
+            <a:extLst>
+              <a:ext uri="{28A0092B-C50C-407E-A947-70E740481C1C}">
+                <a14:useLocalDpi xmlns:a14="http://schemas.microsoft.com/office/drawing/2010/main" val="0"/>
+              </a:ext>
+            </a:extLst>
+          </a:blip>
+          <a:stretch>
+            <a:fillRect/>
+          </a:stretch>
+        </p:blipFill>
+        <p:spPr>
+          <a:xfrm>
+            <a:off x="103409" y="1007659"/>
+            <a:ext cx="6767655" cy="3030583"/>
+          </a:xfrm>
+          <a:prstGeom prst="rect">
+            <a:avLst/>
+          </a:prstGeom>
+        </p:spPr>
+      </p:pic>
+      <p:pic>
+        <p:nvPicPr>
+          <p:cNvPr id="8" name="Picture 7"/>
+          <p:cNvPicPr>
+            <a:picLocks noChangeAspect="1"/>
+          </p:cNvPicPr>
+          <p:nvPr/>
+        </p:nvPicPr>
+        <p:blipFill>
+          <a:blip r:embed="rId3">
+            <a:extLst>
+              <a:ext uri="{28A0092B-C50C-407E-A947-70E740481C1C}">
+                <a14:useLocalDpi xmlns:a14="http://schemas.microsoft.com/office/drawing/2010/main" val="0"/>
+              </a:ext>
+            </a:extLst>
+          </a:blip>
+          <a:stretch>
+            <a:fillRect/>
+          </a:stretch>
+        </p:blipFill>
+        <p:spPr>
+          <a:xfrm>
+            <a:off x="369507" y="4101738"/>
+            <a:ext cx="6028637" cy="2756262"/>
+          </a:xfrm>
+          <a:prstGeom prst="rect">
+            <a:avLst/>
+          </a:prstGeom>
+        </p:spPr>
+      </p:pic>
+      <p:sp>
+        <p:nvSpPr>
+          <p:cNvPr id="9" name="TextBox 8"/>
           <p:cNvSpPr txBox="1"/>
           <p:nvPr/>
         </p:nvSpPr>
         <p:spPr>
           <a:xfrm>
-            <a:off x="362439" y="1899649"/>
-            <a:ext cx="10659291" cy="2585323"/>
+            <a:off x="7026047" y="509276"/>
+            <a:ext cx="4624251" cy="4801314"/>
           </a:xfrm>
           <a:prstGeom prst="rect">
             <a:avLst/>
@@ -3537,12 +3593,30 @@
           </a:bodyPr>
           <a:lstStyle/>
           <a:p>
-            <a:pPr marL="342900" indent="-342900">
-              <a:buAutoNum type="arabicPeriod"/>
+            <a:r>
+              <a:rPr lang="en-US" b="1" dirty="0"/>
+              <a:t>Popularity by Type During the Pandemic-Q4/2020 vs. Q4/2021</a:t>
+            </a:r>
+            <a:endParaRPr lang="en-US" dirty="0"/>
+          </a:p>
+          <a:p>
+            <a:pPr marL="285750" indent="-285750">
+              <a:buFont typeface="Arial" panose="020B0604020202020204" pitchFamily="34" charset="0"/>
+              <a:buChar char="•"/>
             </a:pPr>
             <a:r>
               <a:rPr lang="en-US" dirty="0"/>
-              <a:t>Based on the results from the pandemic, we can see that most people preferred to watch TV shows. This is likely to have been a result of the lockdowns and people had more time to watch TV shows. Also, the popularity of certain TV shows (example-Tiger King) resulted in more people watching specifically Netflix exclusive TV shows. We could see decreases amongst the Netflix exclusive TV shows over the course of the pandemic but the comparison between the 2</a:t>
+              <a:t>Compare the results between the two quarters.</a:t>
+            </a:r>
+          </a:p>
+          <a:p>
+            <a:pPr marL="285750" indent="-285750">
+              <a:buFont typeface="Arial" panose="020B0604020202020204" pitchFamily="34" charset="0"/>
+              <a:buChar char="•"/>
+            </a:pPr>
+            <a:r>
+              <a:rPr lang="en-US" dirty="0"/>
+              <a:t>Netflix Exclusive TV shows increased a lot bringing it back to the around the same level as the 2</a:t>
             </a:r>
             <a:r>
               <a:rPr lang="en-US" baseline="30000" dirty="0"/>
@@ -3550,240 +3624,56 @@
             </a:r>
             <a:r>
               <a:rPr lang="en-US" dirty="0"/>
-              <a:t> quarter of 2020 and the 4</a:t>
-            </a:r>
-            <a:r>
-              <a:rPr lang="en-US" baseline="30000" dirty="0"/>
-              <a:t>th</a:t>
-            </a:r>
+              <a:t> quarter of 2020. </a:t>
+            </a:r>
+          </a:p>
+          <a:p>
+            <a:pPr marL="285750" indent="-285750">
+              <a:buFont typeface="Arial" panose="020B0604020202020204" pitchFamily="34" charset="0"/>
+              <a:buChar char="•"/>
+            </a:pPr>
             <a:r>
               <a:rPr lang="en-US" dirty="0"/>
-              <a:t> quarter of 2021, we could see that there was little change to the popularity of Netflix exclusives.</a:t>
-            </a:r>
-          </a:p>
-          <a:p>
-            <a:pPr marL="342900" indent="-342900">
-              <a:buAutoNum type="arabicPeriod"/>
+              <a:t>We could see that Netflix Exclusive movies actually increased slightly over the same time period but the non-exclusive movies and TV shows remained around the same or decreased.</a:t>
+            </a:r>
+          </a:p>
+          <a:p>
+            <a:pPr marL="285750" indent="-285750">
+              <a:buFont typeface="Arial" panose="020B0604020202020204" pitchFamily="34" charset="0"/>
+              <a:buChar char="•"/>
             </a:pPr>
-            <a:endParaRPr lang="en-US" dirty="0"/>
-          </a:p>
-          <a:p>
-            <a:pPr marL="342900" indent="-342900">
-              <a:buAutoNum type="arabicPeriod"/>
-            </a:pPr>
             <a:r>
               <a:rPr lang="en-US" dirty="0"/>
-              <a:t>Netflix is likely capable of being able to produce TV shows at a faster rate than movies which is likely the reason why there are a lot of options for users to watch new TV shows.</a:t>
-            </a:r>
-          </a:p>
-        </p:txBody>
-      </p:sp>
-      <p:sp>
-        <p:nvSpPr>
-          <p:cNvPr id="3" name="Text Placeholder 2">
-            <a:extLst>
-              <a:ext uri="{FF2B5EF4-FFF2-40B4-BE49-F238E27FC236}">
-                <a16:creationId xmlns:a16="http://schemas.microsoft.com/office/drawing/2014/main" id="{5054D899-C05C-5F87-A7E0-544F9DEF3900}"/>
-              </a:ext>
-            </a:extLst>
-          </p:cNvPr>
-          <p:cNvSpPr txBox="1">
-            <a:spLocks/>
-          </p:cNvSpPr>
+              <a:t>Throughout the timeframe, we could see a small number of comedy specials in the daily Top 10 that resulted no more than 1-2% per quarter.</a:t>
+            </a:r>
+          </a:p>
+        </p:txBody>
+      </p:sp>
+      <p:sp>
+        <p:nvSpPr>
+          <p:cNvPr id="10" name="TextBox 9"/>
+          <p:cNvSpPr txBox="1"/>
           <p:nvPr/>
         </p:nvSpPr>
         <p:spPr>
           <a:xfrm>
-            <a:off x="333120" y="108617"/>
-            <a:ext cx="5928195" cy="489064"/>
+            <a:off x="207812" y="155333"/>
+            <a:ext cx="6426654" cy="707886"/>
           </a:xfrm>
           <a:prstGeom prst="rect">
             <a:avLst/>
           </a:prstGeom>
-        </p:spPr>
-        <p:txBody>
-          <a:bodyPr/>
-          <a:lstStyle>
-            <a:lvl1pPr marL="228600" indent="-228600" algn="l" defTabSz="914400" rtl="0" eaLnBrk="1" latinLnBrk="0" hangingPunct="1">
-              <a:lnSpc>
-                <a:spcPct val="90000"/>
-              </a:lnSpc>
-              <a:spcBef>
-                <a:spcPts val="1000"/>
-              </a:spcBef>
-              <a:buFontTx/>
-              <a:buBlip>
-                <a:blip r:embed="rId2"/>
-              </a:buBlip>
-              <a:defRPr sz="2800" b="0" i="0" kern="1200">
-                <a:solidFill>
-                  <a:schemeClr val="tx1"/>
-                </a:solidFill>
-                <a:latin typeface="Open Sans" panose="020B0606030504020204" pitchFamily="34" charset="0"/>
-                <a:ea typeface="Open Sans" panose="020B0606030504020204" pitchFamily="34" charset="0"/>
-                <a:cs typeface="Open Sans" panose="020B0606030504020204" pitchFamily="34" charset="0"/>
-              </a:defRPr>
-            </a:lvl1pPr>
-            <a:lvl2pPr marL="685800" indent="-228600" algn="l" defTabSz="914400" rtl="0" eaLnBrk="1" latinLnBrk="0" hangingPunct="1">
-              <a:lnSpc>
-                <a:spcPct val="90000"/>
-              </a:lnSpc>
-              <a:spcBef>
-                <a:spcPts val="500"/>
-              </a:spcBef>
-              <a:buFontTx/>
-              <a:buBlip>
-                <a:blip r:embed="rId2"/>
-              </a:buBlip>
-              <a:defRPr sz="2400" b="0" i="0" kern="1200">
-                <a:solidFill>
-                  <a:schemeClr val="tx1"/>
-                </a:solidFill>
-                <a:latin typeface="Open Sans" panose="020B0606030504020204" pitchFamily="34" charset="0"/>
-                <a:ea typeface="Open Sans" panose="020B0606030504020204" pitchFamily="34" charset="0"/>
-                <a:cs typeface="Open Sans" panose="020B0606030504020204" pitchFamily="34" charset="0"/>
-              </a:defRPr>
-            </a:lvl2pPr>
-            <a:lvl3pPr marL="1143000" indent="-228600" algn="l" defTabSz="914400" rtl="0" eaLnBrk="1" latinLnBrk="0" hangingPunct="1">
-              <a:lnSpc>
-                <a:spcPct val="90000"/>
-              </a:lnSpc>
-              <a:spcBef>
-                <a:spcPts val="500"/>
-              </a:spcBef>
-              <a:buFontTx/>
-              <a:buBlip>
-                <a:blip r:embed="rId2"/>
-              </a:buBlip>
-              <a:defRPr sz="2000" b="0" i="0" kern="1200">
-                <a:solidFill>
-                  <a:schemeClr val="tx1"/>
-                </a:solidFill>
-                <a:latin typeface="Open Sans" panose="020B0606030504020204" pitchFamily="34" charset="0"/>
-                <a:ea typeface="Open Sans" panose="020B0606030504020204" pitchFamily="34" charset="0"/>
-                <a:cs typeface="Open Sans" panose="020B0606030504020204" pitchFamily="34" charset="0"/>
-              </a:defRPr>
-            </a:lvl3pPr>
-            <a:lvl4pPr marL="1600200" indent="-228600" algn="l" defTabSz="914400" rtl="0" eaLnBrk="1" latinLnBrk="0" hangingPunct="1">
-              <a:lnSpc>
-                <a:spcPct val="90000"/>
-              </a:lnSpc>
-              <a:spcBef>
-                <a:spcPts val="500"/>
-              </a:spcBef>
-              <a:buFontTx/>
-              <a:buBlip>
-                <a:blip r:embed="rId2"/>
-              </a:buBlip>
-              <a:defRPr sz="1800" b="0" i="0" kern="1200">
-                <a:solidFill>
-                  <a:schemeClr val="tx1"/>
-                </a:solidFill>
-                <a:latin typeface="Open Sans" panose="020B0606030504020204" pitchFamily="34" charset="0"/>
-                <a:ea typeface="Open Sans" panose="020B0606030504020204" pitchFamily="34" charset="0"/>
-                <a:cs typeface="Open Sans" panose="020B0606030504020204" pitchFamily="34" charset="0"/>
-              </a:defRPr>
-            </a:lvl4pPr>
-            <a:lvl5pPr marL="2057400" indent="-228600" algn="l" defTabSz="914400" rtl="0" eaLnBrk="1" latinLnBrk="0" hangingPunct="1">
-              <a:lnSpc>
-                <a:spcPct val="90000"/>
-              </a:lnSpc>
-              <a:spcBef>
-                <a:spcPts val="500"/>
-              </a:spcBef>
-              <a:buFontTx/>
-              <a:buBlip>
-                <a:blip r:embed="rId2"/>
-              </a:buBlip>
-              <a:defRPr sz="1800" b="0" i="0" kern="1200">
-                <a:solidFill>
-                  <a:schemeClr val="tx1"/>
-                </a:solidFill>
-                <a:latin typeface="Open Sans" panose="020B0606030504020204" pitchFamily="34" charset="0"/>
-                <a:ea typeface="Open Sans" panose="020B0606030504020204" pitchFamily="34" charset="0"/>
-                <a:cs typeface="Open Sans" panose="020B0606030504020204" pitchFamily="34" charset="0"/>
-              </a:defRPr>
-            </a:lvl5pPr>
-            <a:lvl6pPr marL="2514600" indent="-228600" algn="l" defTabSz="914400" rtl="0" eaLnBrk="1" latinLnBrk="0" hangingPunct="1">
-              <a:lnSpc>
-                <a:spcPct val="90000"/>
-              </a:lnSpc>
-              <a:spcBef>
-                <a:spcPts val="500"/>
-              </a:spcBef>
-              <a:buFont typeface="Arial" panose="020B0604020202020204" pitchFamily="34" charset="0"/>
-              <a:buChar char="•"/>
-              <a:defRPr sz="1800" kern="1200">
-                <a:solidFill>
-                  <a:schemeClr val="tx1"/>
-                </a:solidFill>
-                <a:latin typeface="+mn-lt"/>
-                <a:ea typeface="+mn-ea"/>
-                <a:cs typeface="+mn-cs"/>
-              </a:defRPr>
-            </a:lvl6pPr>
-            <a:lvl7pPr marL="2971800" indent="-228600" algn="l" defTabSz="914400" rtl="0" eaLnBrk="1" latinLnBrk="0" hangingPunct="1">
-              <a:lnSpc>
-                <a:spcPct val="90000"/>
-              </a:lnSpc>
-              <a:spcBef>
-                <a:spcPts val="500"/>
-              </a:spcBef>
-              <a:buFont typeface="Arial" panose="020B0604020202020204" pitchFamily="34" charset="0"/>
-              <a:buChar char="•"/>
-              <a:defRPr sz="1800" kern="1200">
-                <a:solidFill>
-                  <a:schemeClr val="tx1"/>
-                </a:solidFill>
-                <a:latin typeface="+mn-lt"/>
-                <a:ea typeface="+mn-ea"/>
-                <a:cs typeface="+mn-cs"/>
-              </a:defRPr>
-            </a:lvl7pPr>
-            <a:lvl8pPr marL="3429000" indent="-228600" algn="l" defTabSz="914400" rtl="0" eaLnBrk="1" latinLnBrk="0" hangingPunct="1">
-              <a:lnSpc>
-                <a:spcPct val="90000"/>
-              </a:lnSpc>
-              <a:spcBef>
-                <a:spcPts val="500"/>
-              </a:spcBef>
-              <a:buFont typeface="Arial" panose="020B0604020202020204" pitchFamily="34" charset="0"/>
-              <a:buChar char="•"/>
-              <a:defRPr sz="1800" kern="1200">
-                <a:solidFill>
-                  <a:schemeClr val="tx1"/>
-                </a:solidFill>
-                <a:latin typeface="+mn-lt"/>
-                <a:ea typeface="+mn-ea"/>
-                <a:cs typeface="+mn-cs"/>
-              </a:defRPr>
-            </a:lvl8pPr>
-            <a:lvl9pPr marL="3886200" indent="-228600" algn="l" defTabSz="914400" rtl="0" eaLnBrk="1" latinLnBrk="0" hangingPunct="1">
-              <a:lnSpc>
-                <a:spcPct val="90000"/>
-              </a:lnSpc>
-              <a:spcBef>
-                <a:spcPts val="500"/>
-              </a:spcBef>
-              <a:buFont typeface="Arial" panose="020B0604020202020204" pitchFamily="34" charset="0"/>
-              <a:buChar char="•"/>
-              <a:defRPr sz="1800" kern="1200">
-                <a:solidFill>
-                  <a:schemeClr val="tx1"/>
-                </a:solidFill>
-                <a:latin typeface="+mn-lt"/>
-                <a:ea typeface="+mn-ea"/>
-                <a:cs typeface="+mn-cs"/>
-              </a:defRPr>
-            </a:lvl9pPr>
-          </a:lstStyle>
-          <a:p>
-            <a:pPr marL="0" indent="0">
-              <a:buNone/>
-            </a:pPr>
-            <a:r>
-              <a:rPr lang="en-GB" sz="3200" b="1" dirty="0"/>
-              <a:t>Discussion and Conclusion</a:t>
+          <a:noFill/>
+        </p:spPr>
+        <p:txBody>
+          <a:bodyPr wrap="square" rtlCol="0">
+            <a:spAutoFit/>
+          </a:bodyPr>
+          <a:lstStyle/>
+          <a:p>
+            <a:r>
+              <a:rPr lang="en-US" sz="2000" b="1" dirty="0"/>
+              <a:t>What was the popular type of entertainment on Netflix during the pandemic?</a:t>
             </a:r>
           </a:p>
         </p:txBody>
@@ -3791,7 +3681,7 @@
     </p:spTree>
     <p:extLst>
       <p:ext uri="{BB962C8B-B14F-4D97-AF65-F5344CB8AC3E}">
-        <p14:creationId xmlns:p14="http://schemas.microsoft.com/office/powerpoint/2010/main" val="2473088299"/>
+        <p14:creationId xmlns:p14="http://schemas.microsoft.com/office/powerpoint/2010/main" val="792271978"/>
       </p:ext>
     </p:extLst>
   </p:cSld>
@@ -3820,6 +3710,309 @@
       </p:grpSpPr>
       <p:sp>
         <p:nvSpPr>
+          <p:cNvPr id="2" name="TextBox 1"/>
+          <p:cNvSpPr txBox="1"/>
+          <p:nvPr/>
+        </p:nvSpPr>
+        <p:spPr>
+          <a:xfrm>
+            <a:off x="362439" y="1899649"/>
+            <a:ext cx="10659291" cy="2585323"/>
+          </a:xfrm>
+          <a:prstGeom prst="rect">
+            <a:avLst/>
+          </a:prstGeom>
+          <a:noFill/>
+        </p:spPr>
+        <p:txBody>
+          <a:bodyPr wrap="square" rtlCol="0">
+            <a:spAutoFit/>
+          </a:bodyPr>
+          <a:lstStyle/>
+          <a:p>
+            <a:pPr marL="342900" indent="-342900">
+              <a:buAutoNum type="arabicPeriod"/>
+            </a:pPr>
+            <a:r>
+              <a:rPr lang="en-US" dirty="0"/>
+              <a:t>Based on the results from the pandemic, we can see that most people preferred to watch TV shows. This is likely to have been a result of the lockdowns and people had more time to watch TV shows. Also, the popularity of certain TV shows (example-Tiger King) resulted in more people watching specifically Netflix exclusive TV shows. We could see decreases amongst the Netflix exclusive TV shows over the course of the pandemic but the comparison between the 2</a:t>
+            </a:r>
+            <a:r>
+              <a:rPr lang="en-US" baseline="30000" dirty="0"/>
+              <a:t>nd</a:t>
+            </a:r>
+            <a:r>
+              <a:rPr lang="en-US" dirty="0"/>
+              <a:t> quarter of 2020 and the 4</a:t>
+            </a:r>
+            <a:r>
+              <a:rPr lang="en-US" baseline="30000" dirty="0"/>
+              <a:t>th</a:t>
+            </a:r>
+            <a:r>
+              <a:rPr lang="en-US" dirty="0"/>
+              <a:t> quarter of 2021, we could see that there was little change to the popularity of Netflix exclusives.</a:t>
+            </a:r>
+          </a:p>
+          <a:p>
+            <a:pPr marL="342900" indent="-342900">
+              <a:buAutoNum type="arabicPeriod"/>
+            </a:pPr>
+            <a:endParaRPr lang="en-US" dirty="0"/>
+          </a:p>
+          <a:p>
+            <a:pPr marL="342900" indent="-342900">
+              <a:buAutoNum type="arabicPeriod"/>
+            </a:pPr>
+            <a:r>
+              <a:rPr lang="en-US" dirty="0"/>
+              <a:t>Netflix is likely capable of being able to produce TV shows at a faster rate than movies which is likely the reason why there are a lot of options for users to watch new TV shows.</a:t>
+            </a:r>
+          </a:p>
+        </p:txBody>
+      </p:sp>
+      <p:sp>
+        <p:nvSpPr>
+          <p:cNvPr id="3" name="Text Placeholder 2">
+            <a:extLst>
+              <a:ext uri="{FF2B5EF4-FFF2-40B4-BE49-F238E27FC236}">
+                <a16:creationId xmlns:a16="http://schemas.microsoft.com/office/drawing/2014/main" id="{5054D899-C05C-5F87-A7E0-544F9DEF3900}"/>
+              </a:ext>
+            </a:extLst>
+          </p:cNvPr>
+          <p:cNvSpPr txBox="1">
+            <a:spLocks/>
+          </p:cNvSpPr>
+          <p:nvPr/>
+        </p:nvSpPr>
+        <p:spPr>
+          <a:xfrm>
+            <a:off x="333120" y="108617"/>
+            <a:ext cx="5928195" cy="489064"/>
+          </a:xfrm>
+          <a:prstGeom prst="rect">
+            <a:avLst/>
+          </a:prstGeom>
+        </p:spPr>
+        <p:txBody>
+          <a:bodyPr/>
+          <a:lstStyle>
+            <a:lvl1pPr marL="228600" indent="-228600" algn="l" defTabSz="914400" rtl="0" eaLnBrk="1" latinLnBrk="0" hangingPunct="1">
+              <a:lnSpc>
+                <a:spcPct val="90000"/>
+              </a:lnSpc>
+              <a:spcBef>
+                <a:spcPts val="1000"/>
+              </a:spcBef>
+              <a:buFontTx/>
+              <a:buBlip>
+                <a:blip r:embed="rId2"/>
+              </a:buBlip>
+              <a:defRPr sz="2800" b="0" i="0" kern="1200">
+                <a:solidFill>
+                  <a:schemeClr val="tx1"/>
+                </a:solidFill>
+                <a:latin typeface="Open Sans" panose="020B0606030504020204" pitchFamily="34" charset="0"/>
+                <a:ea typeface="Open Sans" panose="020B0606030504020204" pitchFamily="34" charset="0"/>
+                <a:cs typeface="Open Sans" panose="020B0606030504020204" pitchFamily="34" charset="0"/>
+              </a:defRPr>
+            </a:lvl1pPr>
+            <a:lvl2pPr marL="685800" indent="-228600" algn="l" defTabSz="914400" rtl="0" eaLnBrk="1" latinLnBrk="0" hangingPunct="1">
+              <a:lnSpc>
+                <a:spcPct val="90000"/>
+              </a:lnSpc>
+              <a:spcBef>
+                <a:spcPts val="500"/>
+              </a:spcBef>
+              <a:buFontTx/>
+              <a:buBlip>
+                <a:blip r:embed="rId2"/>
+              </a:buBlip>
+              <a:defRPr sz="2400" b="0" i="0" kern="1200">
+                <a:solidFill>
+                  <a:schemeClr val="tx1"/>
+                </a:solidFill>
+                <a:latin typeface="Open Sans" panose="020B0606030504020204" pitchFamily="34" charset="0"/>
+                <a:ea typeface="Open Sans" panose="020B0606030504020204" pitchFamily="34" charset="0"/>
+                <a:cs typeface="Open Sans" panose="020B0606030504020204" pitchFamily="34" charset="0"/>
+              </a:defRPr>
+            </a:lvl2pPr>
+            <a:lvl3pPr marL="1143000" indent="-228600" algn="l" defTabSz="914400" rtl="0" eaLnBrk="1" latinLnBrk="0" hangingPunct="1">
+              <a:lnSpc>
+                <a:spcPct val="90000"/>
+              </a:lnSpc>
+              <a:spcBef>
+                <a:spcPts val="500"/>
+              </a:spcBef>
+              <a:buFontTx/>
+              <a:buBlip>
+                <a:blip r:embed="rId2"/>
+              </a:buBlip>
+              <a:defRPr sz="2000" b="0" i="0" kern="1200">
+                <a:solidFill>
+                  <a:schemeClr val="tx1"/>
+                </a:solidFill>
+                <a:latin typeface="Open Sans" panose="020B0606030504020204" pitchFamily="34" charset="0"/>
+                <a:ea typeface="Open Sans" panose="020B0606030504020204" pitchFamily="34" charset="0"/>
+                <a:cs typeface="Open Sans" panose="020B0606030504020204" pitchFamily="34" charset="0"/>
+              </a:defRPr>
+            </a:lvl3pPr>
+            <a:lvl4pPr marL="1600200" indent="-228600" algn="l" defTabSz="914400" rtl="0" eaLnBrk="1" latinLnBrk="0" hangingPunct="1">
+              <a:lnSpc>
+                <a:spcPct val="90000"/>
+              </a:lnSpc>
+              <a:spcBef>
+                <a:spcPts val="500"/>
+              </a:spcBef>
+              <a:buFontTx/>
+              <a:buBlip>
+                <a:blip r:embed="rId2"/>
+              </a:buBlip>
+              <a:defRPr sz="1800" b="0" i="0" kern="1200">
+                <a:solidFill>
+                  <a:schemeClr val="tx1"/>
+                </a:solidFill>
+                <a:latin typeface="Open Sans" panose="020B0606030504020204" pitchFamily="34" charset="0"/>
+                <a:ea typeface="Open Sans" panose="020B0606030504020204" pitchFamily="34" charset="0"/>
+                <a:cs typeface="Open Sans" panose="020B0606030504020204" pitchFamily="34" charset="0"/>
+              </a:defRPr>
+            </a:lvl4pPr>
+            <a:lvl5pPr marL="2057400" indent="-228600" algn="l" defTabSz="914400" rtl="0" eaLnBrk="1" latinLnBrk="0" hangingPunct="1">
+              <a:lnSpc>
+                <a:spcPct val="90000"/>
+              </a:lnSpc>
+              <a:spcBef>
+                <a:spcPts val="500"/>
+              </a:spcBef>
+              <a:buFontTx/>
+              <a:buBlip>
+                <a:blip r:embed="rId2"/>
+              </a:buBlip>
+              <a:defRPr sz="1800" b="0" i="0" kern="1200">
+                <a:solidFill>
+                  <a:schemeClr val="tx1"/>
+                </a:solidFill>
+                <a:latin typeface="Open Sans" panose="020B0606030504020204" pitchFamily="34" charset="0"/>
+                <a:ea typeface="Open Sans" panose="020B0606030504020204" pitchFamily="34" charset="0"/>
+                <a:cs typeface="Open Sans" panose="020B0606030504020204" pitchFamily="34" charset="0"/>
+              </a:defRPr>
+            </a:lvl5pPr>
+            <a:lvl6pPr marL="2514600" indent="-228600" algn="l" defTabSz="914400" rtl="0" eaLnBrk="1" latinLnBrk="0" hangingPunct="1">
+              <a:lnSpc>
+                <a:spcPct val="90000"/>
+              </a:lnSpc>
+              <a:spcBef>
+                <a:spcPts val="500"/>
+              </a:spcBef>
+              <a:buFont typeface="Arial" panose="020B0604020202020204" pitchFamily="34" charset="0"/>
+              <a:buChar char="•"/>
+              <a:defRPr sz="1800" kern="1200">
+                <a:solidFill>
+                  <a:schemeClr val="tx1"/>
+                </a:solidFill>
+                <a:latin typeface="+mn-lt"/>
+                <a:ea typeface="+mn-ea"/>
+                <a:cs typeface="+mn-cs"/>
+              </a:defRPr>
+            </a:lvl6pPr>
+            <a:lvl7pPr marL="2971800" indent="-228600" algn="l" defTabSz="914400" rtl="0" eaLnBrk="1" latinLnBrk="0" hangingPunct="1">
+              <a:lnSpc>
+                <a:spcPct val="90000"/>
+              </a:lnSpc>
+              <a:spcBef>
+                <a:spcPts val="500"/>
+              </a:spcBef>
+              <a:buFont typeface="Arial" panose="020B0604020202020204" pitchFamily="34" charset="0"/>
+              <a:buChar char="•"/>
+              <a:defRPr sz="1800" kern="1200">
+                <a:solidFill>
+                  <a:schemeClr val="tx1"/>
+                </a:solidFill>
+                <a:latin typeface="+mn-lt"/>
+                <a:ea typeface="+mn-ea"/>
+                <a:cs typeface="+mn-cs"/>
+              </a:defRPr>
+            </a:lvl7pPr>
+            <a:lvl8pPr marL="3429000" indent="-228600" algn="l" defTabSz="914400" rtl="0" eaLnBrk="1" latinLnBrk="0" hangingPunct="1">
+              <a:lnSpc>
+                <a:spcPct val="90000"/>
+              </a:lnSpc>
+              <a:spcBef>
+                <a:spcPts val="500"/>
+              </a:spcBef>
+              <a:buFont typeface="Arial" panose="020B0604020202020204" pitchFamily="34" charset="0"/>
+              <a:buChar char="•"/>
+              <a:defRPr sz="1800" kern="1200">
+                <a:solidFill>
+                  <a:schemeClr val="tx1"/>
+                </a:solidFill>
+                <a:latin typeface="+mn-lt"/>
+                <a:ea typeface="+mn-ea"/>
+                <a:cs typeface="+mn-cs"/>
+              </a:defRPr>
+            </a:lvl8pPr>
+            <a:lvl9pPr marL="3886200" indent="-228600" algn="l" defTabSz="914400" rtl="0" eaLnBrk="1" latinLnBrk="0" hangingPunct="1">
+              <a:lnSpc>
+                <a:spcPct val="90000"/>
+              </a:lnSpc>
+              <a:spcBef>
+                <a:spcPts val="500"/>
+              </a:spcBef>
+              <a:buFont typeface="Arial" panose="020B0604020202020204" pitchFamily="34" charset="0"/>
+              <a:buChar char="•"/>
+              <a:defRPr sz="1800" kern="1200">
+                <a:solidFill>
+                  <a:schemeClr val="tx1"/>
+                </a:solidFill>
+                <a:latin typeface="+mn-lt"/>
+                <a:ea typeface="+mn-ea"/>
+                <a:cs typeface="+mn-cs"/>
+              </a:defRPr>
+            </a:lvl9pPr>
+          </a:lstStyle>
+          <a:p>
+            <a:pPr marL="0" indent="0">
+              <a:buNone/>
+            </a:pPr>
+            <a:r>
+              <a:rPr lang="en-GB" sz="3200" b="1" dirty="0"/>
+              <a:t>Discussion and Conclusion</a:t>
+            </a:r>
+          </a:p>
+        </p:txBody>
+      </p:sp>
+    </p:spTree>
+    <p:extLst>
+      <p:ext uri="{BB962C8B-B14F-4D97-AF65-F5344CB8AC3E}">
+        <p14:creationId xmlns:p14="http://schemas.microsoft.com/office/powerpoint/2010/main" val="2473088299"/>
+      </p:ext>
+    </p:extLst>
+  </p:cSld>
+  <p:clrMapOvr>
+    <a:masterClrMapping/>
+  </p:clrMapOvr>
+</p:sld>
+</file>
+
+<file path=ppt/slides/slide14.xml><?xml version="1.0" encoding="utf-8"?>
+<p:sld xmlns:a="http://schemas.openxmlformats.org/drawingml/2006/main" xmlns:r="http://schemas.openxmlformats.org/officeDocument/2006/relationships" xmlns:p="http://schemas.openxmlformats.org/presentationml/2006/main">
+  <p:cSld>
+    <p:spTree>
+      <p:nvGrpSpPr>
+        <p:cNvPr id="1" name=""/>
+        <p:cNvGrpSpPr/>
+        <p:nvPr/>
+      </p:nvGrpSpPr>
+      <p:grpSpPr>
+        <a:xfrm>
+          <a:off x="0" y="0"/>
+          <a:ext cx="0" cy="0"/>
+          <a:chOff x="0" y="0"/>
+          <a:chExt cx="0" cy="0"/>
+        </a:xfrm>
+      </p:grpSpPr>
+      <p:sp>
+        <p:nvSpPr>
           <p:cNvPr id="2" name="TextBox 1">
             <a:extLst>
               <a:ext uri="{FF2B5EF4-FFF2-40B4-BE49-F238E27FC236}">
@@ -3998,7 +4191,7 @@
 </p:sld>
 </file>
 
-<file path=ppt/slides/slide14.xml><?xml version="1.0" encoding="utf-8"?>
+<file path=ppt/slides/slide15.xml><?xml version="1.0" encoding="utf-8"?>
 <p:sld xmlns:a="http://schemas.openxmlformats.org/drawingml/2006/main" xmlns:r="http://schemas.openxmlformats.org/officeDocument/2006/relationships" xmlns:p="http://schemas.openxmlformats.org/presentationml/2006/main">
   <p:cSld>
     <p:spTree>
@@ -4338,7 +4531,7 @@
 </p:sld>
 </file>
 
-<file path=ppt/slides/slide15.xml><?xml version="1.0" encoding="utf-8"?>
+<file path=ppt/slides/slide16.xml><?xml version="1.0" encoding="utf-8"?>
 <p:sld xmlns:a="http://schemas.openxmlformats.org/drawingml/2006/main" xmlns:r="http://schemas.openxmlformats.org/officeDocument/2006/relationships" xmlns:p="http://schemas.openxmlformats.org/presentationml/2006/main">
   <p:cSld>
     <p:spTree>
@@ -4581,7 +4774,7 @@
 </p:sld>
 </file>
 
-<file path=ppt/slides/slide16.xml><?xml version="1.0" encoding="utf-8"?>
+<file path=ppt/slides/slide17.xml><?xml version="1.0" encoding="utf-8"?>
 <p:sld xmlns:a="http://schemas.openxmlformats.org/drawingml/2006/main" xmlns:r="http://schemas.openxmlformats.org/officeDocument/2006/relationships" xmlns:p="http://schemas.openxmlformats.org/presentationml/2006/main">
   <p:cSld>
     <p:spTree>
@@ -4831,7 +5024,7 @@
 </p:sld>
 </file>
 
-<file path=ppt/slides/slide17.xml><?xml version="1.0" encoding="utf-8"?>
+<file path=ppt/slides/slide18.xml><?xml version="1.0" encoding="utf-8"?>
 <p:sld xmlns:a="http://schemas.openxmlformats.org/drawingml/2006/main" xmlns:r="http://schemas.openxmlformats.org/officeDocument/2006/relationships" xmlns:p="http://schemas.openxmlformats.org/presentationml/2006/main">
   <p:cSld>
     <p:spTree>
@@ -7401,6 +7594,58 @@
           </a:p>
         </p:txBody>
       </p:sp>
+      <p:sp>
+        <p:nvSpPr>
+          <p:cNvPr id="5" name="TextBox 4">
+            <a:extLst>
+              <a:ext uri="{FF2B5EF4-FFF2-40B4-BE49-F238E27FC236}">
+                <a16:creationId xmlns:a16="http://schemas.microsoft.com/office/drawing/2014/main" id="{E907E6DB-1FFF-AF48-AA0B-AB777D5FF23D}"/>
+              </a:ext>
+            </a:extLst>
+          </p:cNvPr>
+          <p:cNvSpPr txBox="1"/>
+          <p:nvPr/>
+        </p:nvSpPr>
+        <p:spPr>
+          <a:xfrm>
+            <a:off x="7398393" y="1437752"/>
+            <a:ext cx="4624251" cy="1754326"/>
+          </a:xfrm>
+          <a:prstGeom prst="rect">
+            <a:avLst/>
+          </a:prstGeom>
+          <a:noFill/>
+        </p:spPr>
+        <p:txBody>
+          <a:bodyPr wrap="square" rtlCol="0">
+            <a:spAutoFit/>
+          </a:bodyPr>
+          <a:lstStyle/>
+          <a:p>
+            <a:pPr marL="285750" indent="-285750">
+              <a:buFont typeface="Arial" panose="020B0604020202020204" pitchFamily="34" charset="0"/>
+              <a:buChar char="•"/>
+            </a:pPr>
+            <a:r>
+              <a:rPr lang="en-US" dirty="0"/>
+              <a:t>This visualization shows genres of both tv shows and movies. </a:t>
+            </a:r>
+          </a:p>
+          <a:p>
+            <a:endParaRPr lang="en-US" dirty="0"/>
+          </a:p>
+          <a:p>
+            <a:pPr marL="285750" indent="-285750">
+              <a:buFont typeface="Arial" panose="020B0604020202020204" pitchFamily="34" charset="0"/>
+              <a:buChar char="•"/>
+            </a:pPr>
+            <a:r>
+              <a:rPr lang="en-US" dirty="0"/>
+              <a:t>It is known that movies are far high compared to tv shows in the last three years.</a:t>
+            </a:r>
+          </a:p>
+        </p:txBody>
+      </p:sp>
     </p:spTree>
     <p:extLst>
       <p:ext uri="{BB962C8B-B14F-4D97-AF65-F5344CB8AC3E}">
@@ -7431,51 +7676,12 @@
           <a:chExt cx="0" cy="0"/>
         </a:xfrm>
       </p:grpSpPr>
-      <p:sp>
-        <p:nvSpPr>
-          <p:cNvPr id="5" name="TextBox 4">
+      <p:pic>
+        <p:nvPicPr>
+          <p:cNvPr id="3" name="Picture 2" descr="Chart, funnel chart&#10;&#10;Description automatically generated">
             <a:extLst>
               <a:ext uri="{FF2B5EF4-FFF2-40B4-BE49-F238E27FC236}">
-                <a16:creationId xmlns:a16="http://schemas.microsoft.com/office/drawing/2014/main" id="{89DD604B-04B6-6E27-70E0-D857309E5875}"/>
-              </a:ext>
-            </a:extLst>
-          </p:cNvPr>
-          <p:cNvSpPr txBox="1"/>
-          <p:nvPr/>
-        </p:nvSpPr>
-        <p:spPr>
-          <a:xfrm>
-            <a:off x="371957" y="126965"/>
-            <a:ext cx="8214103" cy="707886"/>
-          </a:xfrm>
-          <a:prstGeom prst="rect">
-            <a:avLst/>
-          </a:prstGeom>
-          <a:noFill/>
-        </p:spPr>
-        <p:txBody>
-          <a:bodyPr wrap="square" rtlCol="0">
-            <a:spAutoFit/>
-          </a:bodyPr>
-          <a:lstStyle/>
-          <a:p>
-            <a:r>
-              <a:rPr lang="en-US" sz="2000" b="1" dirty="0">
-                <a:latin typeface="Open Sans" panose="020B0606030504020204" pitchFamily="34" charset="0"/>
-                <a:ea typeface="Open Sans" panose="020B0606030504020204" pitchFamily="34" charset="0"/>
-                <a:cs typeface="Open Sans" panose="020B0606030504020204" pitchFamily="34" charset="0"/>
-              </a:rPr>
-              <a:t>What are the top genres distributed by Netflix for both movies and tv shows in the last three years (2019, 2020, 2021)?</a:t>
-            </a:r>
-          </a:p>
-        </p:txBody>
-      </p:sp>
-      <p:pic>
-        <p:nvPicPr>
-          <p:cNvPr id="6" name="Picture 5">
-            <a:extLst>
-              <a:ext uri="{FF2B5EF4-FFF2-40B4-BE49-F238E27FC236}">
-                <a16:creationId xmlns:a16="http://schemas.microsoft.com/office/drawing/2014/main" id="{28BD2991-7A52-C13C-B81F-C5D524BC2634}"/>
+                <a16:creationId xmlns:a16="http://schemas.microsoft.com/office/drawing/2014/main" id="{64E7DD20-275A-8A49-94EA-0AF06A3B5EDB}"/>
               </a:ext>
             </a:extLst>
           </p:cNvPr>
@@ -7485,25 +7691,157 @@
           <p:nvPr/>
         </p:nvPicPr>
         <p:blipFill>
-          <a:blip r:embed="rId2"/>
+          <a:blip r:embed="rId2">
+            <a:extLst>
+              <a:ext uri="{28A0092B-C50C-407E-A947-70E740481C1C}">
+                <a14:useLocalDpi xmlns:a14="http://schemas.microsoft.com/office/drawing/2010/main" val="0"/>
+              </a:ext>
+            </a:extLst>
+          </a:blip>
           <a:stretch>
             <a:fillRect/>
           </a:stretch>
         </p:blipFill>
         <p:spPr>
           <a:xfrm>
-            <a:off x="480445" y="1584459"/>
-            <a:ext cx="9289770" cy="4056925"/>
+            <a:off x="1" y="834852"/>
+            <a:ext cx="8343900" cy="5986678"/>
           </a:xfrm>
           <a:prstGeom prst="rect">
             <a:avLst/>
           </a:prstGeom>
         </p:spPr>
       </p:pic>
+      <p:sp>
+        <p:nvSpPr>
+          <p:cNvPr id="6" name="TextBox 5">
+            <a:extLst>
+              <a:ext uri="{FF2B5EF4-FFF2-40B4-BE49-F238E27FC236}">
+                <a16:creationId xmlns:a16="http://schemas.microsoft.com/office/drawing/2014/main" id="{A4543B9A-E913-D94F-A765-3FDD71B93759}"/>
+              </a:ext>
+            </a:extLst>
+          </p:cNvPr>
+          <p:cNvSpPr txBox="1"/>
+          <p:nvPr/>
+        </p:nvSpPr>
+        <p:spPr>
+          <a:xfrm>
+            <a:off x="371957" y="126965"/>
+            <a:ext cx="8214103" cy="707886"/>
+          </a:xfrm>
+          <a:prstGeom prst="rect">
+            <a:avLst/>
+          </a:prstGeom>
+          <a:noFill/>
+        </p:spPr>
+        <p:txBody>
+          <a:bodyPr wrap="square" rtlCol="0">
+            <a:spAutoFit/>
+          </a:bodyPr>
+          <a:lstStyle/>
+          <a:p>
+            <a:r>
+              <a:rPr lang="en-US" sz="2000" b="1" dirty="0">
+                <a:latin typeface="Open Sans" panose="020B0606030504020204" pitchFamily="34" charset="0"/>
+                <a:ea typeface="Open Sans" panose="020B0606030504020204" pitchFamily="34" charset="0"/>
+                <a:cs typeface="Open Sans" panose="020B0606030504020204" pitchFamily="34" charset="0"/>
+              </a:rPr>
+              <a:t>What are the top genres distributed by Netflix for movies in the last three years (2019, 2020, 2021)?</a:t>
+            </a:r>
+          </a:p>
+        </p:txBody>
+      </p:sp>
+      <p:sp>
+        <p:nvSpPr>
+          <p:cNvPr id="8" name="Rectangle 7">
+            <a:extLst>
+              <a:ext uri="{FF2B5EF4-FFF2-40B4-BE49-F238E27FC236}">
+                <a16:creationId xmlns:a16="http://schemas.microsoft.com/office/drawing/2014/main" id="{8164EEF0-A7BA-B645-9A1F-BA9E7CECA353}"/>
+              </a:ext>
+            </a:extLst>
+          </p:cNvPr>
+          <p:cNvSpPr/>
+          <p:nvPr/>
+        </p:nvSpPr>
+        <p:spPr>
+          <a:xfrm>
+            <a:off x="8471760" y="1005260"/>
+            <a:ext cx="3605938" cy="2423740"/>
+          </a:xfrm>
+          <a:prstGeom prst="rect">
+            <a:avLst/>
+          </a:prstGeom>
+        </p:spPr>
+        <p:txBody>
+          <a:bodyPr wrap="square">
+            <a:spAutoFit/>
+          </a:bodyPr>
+          <a:lstStyle/>
+          <a:p>
+            <a:pPr marL="285750" indent="-285750">
+              <a:spcAft>
+                <a:spcPts val="900"/>
+              </a:spcAft>
+              <a:buFont typeface="Arial" panose="020B0604020202020204" pitchFamily="34" charset="0"/>
+              <a:buChar char="•"/>
+            </a:pPr>
+            <a:r>
+              <a:rPr lang="en-US" dirty="0">
+                <a:latin typeface="Arial" panose="020B0604020202020204" pitchFamily="34" charset="0"/>
+                <a:ea typeface="Times New Roman" panose="02020603050405020304" pitchFamily="18" charset="0"/>
+              </a:rPr>
+              <a:t>Netflix offers range of movie genres and most of the content have multiple genres. </a:t>
+            </a:r>
+            <a:r>
+              <a:rPr lang="en-US" dirty="0">
+                <a:latin typeface="Arial" panose="020B0604020202020204" pitchFamily="34" charset="0"/>
+                <a:ea typeface="Times New Roman" panose="02020603050405020304" pitchFamily="18" charset="0"/>
+                <a:cs typeface="Times New Roman" panose="02020603050405020304" pitchFamily="18" charset="0"/>
+              </a:rPr>
+              <a:t> </a:t>
+            </a:r>
+            <a:endParaRPr lang="en-US" sz="2400" dirty="0">
+              <a:latin typeface="Calibri" panose="020F0502020204030204" pitchFamily="34" charset="0"/>
+              <a:ea typeface="Calibri" panose="020F0502020204030204" pitchFamily="34" charset="0"/>
+              <a:cs typeface="Times New Roman" panose="02020603050405020304" pitchFamily="18" charset="0"/>
+            </a:endParaRPr>
+          </a:p>
+          <a:p>
+            <a:pPr marL="285750" indent="-285750">
+              <a:buFont typeface="Arial" panose="020B0604020202020204" pitchFamily="34" charset="0"/>
+              <a:buChar char="•"/>
+            </a:pPr>
+            <a:r>
+              <a:rPr lang="en-US" dirty="0">
+                <a:solidFill>
+                  <a:srgbClr val="000000"/>
+                </a:solidFill>
+                <a:latin typeface="Arial" panose="020B0604020202020204" pitchFamily="34" charset="0"/>
+                <a:ea typeface="Times New Roman" panose="02020603050405020304" pitchFamily="18" charset="0"/>
+                <a:cs typeface="Times New Roman" panose="02020603050405020304" pitchFamily="18" charset="0"/>
+              </a:rPr>
+              <a:t>In the last there years, movie contents is dominated by international genre due to Netflix international presence, which is tied with drama. </a:t>
+            </a:r>
+            <a:r>
+              <a:rPr lang="en-US" dirty="0">
+                <a:latin typeface="Arial" panose="020B0604020202020204" pitchFamily="34" charset="0"/>
+                <a:ea typeface="Times New Roman" panose="02020603050405020304" pitchFamily="18" charset="0"/>
+                <a:cs typeface="Times New Roman" panose="02020603050405020304" pitchFamily="18" charset="0"/>
+              </a:rPr>
+              <a:t> </a:t>
+            </a:r>
+            <a:endParaRPr lang="en-US" sz="2400" dirty="0">
+              <a:latin typeface="Calibri" panose="020F0502020204030204" pitchFamily="34" charset="0"/>
+              <a:ea typeface="Calibri" panose="020F0502020204030204" pitchFamily="34" charset="0"/>
+              <a:cs typeface="Times New Roman" panose="02020603050405020304" pitchFamily="18" charset="0"/>
+            </a:endParaRPr>
+          </a:p>
+        </p:txBody>
+      </p:sp>
     </p:spTree>
     <p:extLst>
       <p:ext uri="{BB962C8B-B14F-4D97-AF65-F5344CB8AC3E}">
-        <p14:creationId xmlns:p14="http://schemas.microsoft.com/office/powerpoint/2010/main" val="2803995205"/>
+        <p14:creationId xmlns:p14="http://schemas.microsoft.com/office/powerpoint/2010/main" val="2097467050"/>
       </p:ext>
     </p:extLst>
   </p:cSld>

</xml_diff>

<commit_message>
Updated PPT with questions
</commit_message>
<xml_diff>
--- a/TeamProjectPPT updated.pptx
+++ b/TeamProjectPPT updated.pptx
@@ -3426,12 +3426,8 @@
               <a:buChar char="•"/>
             </a:pPr>
             <a:r>
-              <a:rPr lang="en-US" dirty="0" smtClean="0"/>
-              <a:t>Compared </a:t>
-            </a:r>
-            <a:r>
               <a:rPr lang="en-US" dirty="0"/>
-              <a:t>the results between the two quarters</a:t>
+              <a:t>Compared the results between the two quarters</a:t>
             </a:r>
           </a:p>
           <a:p>
@@ -3556,7 +3552,7 @@
               <a:tabLst/>
             </a:pPr>
             <a:r>
-              <a:rPr kumimoji="0" lang="en-US" altLang="en-US" sz="1800" b="0" i="0" u="none" strike="noStrike" cap="none" normalizeH="0" baseline="0" smtClean="0">
+              <a:rPr kumimoji="0" lang="en-US" altLang="en-US" sz="1800" b="0" i="0" u="none" strike="noStrike" cap="none" normalizeH="0" baseline="0">
                 <a:ln>
                   <a:noFill/>
                 </a:ln>
@@ -3571,7 +3567,7 @@
               <a:t>https://www.kaggle.com/datasets/prasertk/netflix-daily-top-10-in-us</a:t>
             </a:r>
             <a:r>
-              <a:rPr kumimoji="0" lang="en-US" altLang="en-US" sz="1800" b="0" i="0" u="none" strike="noStrike" cap="none" normalizeH="0" baseline="0" smtClean="0">
+              <a:rPr kumimoji="0" lang="en-US" altLang="en-US" sz="1800" b="0" i="0" u="none" strike="noStrike" cap="none" normalizeH="0" baseline="0">
                 <a:ln>
                   <a:noFill/>
                 </a:ln>
@@ -3582,7 +3578,7 @@
               </a:rPr>
               <a:t> </a:t>
             </a:r>
-            <a:endParaRPr kumimoji="0" lang="en-US" altLang="en-US" sz="1800" b="0" i="0" u="none" strike="noStrike" cap="none" normalizeH="0" baseline="0" smtClean="0">
+            <a:endParaRPr kumimoji="0" lang="en-US" altLang="en-US" sz="1800" b="0" i="0" u="none" strike="noStrike" cap="none" normalizeH="0" baseline="0">
               <a:ln>
                 <a:noFill/>
               </a:ln>
@@ -3719,12 +3715,8 @@
               <a:buChar char="•"/>
             </a:pPr>
             <a:r>
-              <a:rPr lang="en-US" dirty="0" smtClean="0"/>
-              <a:t>Compared </a:t>
-            </a:r>
-            <a:r>
               <a:rPr lang="en-US" dirty="0"/>
-              <a:t>the results between the two quarters.</a:t>
+              <a:t>Compared the results between the two quarters.</a:t>
             </a:r>
           </a:p>
           <a:p>
@@ -3752,15 +3744,7 @@
             </a:pPr>
             <a:r>
               <a:rPr lang="en-US" dirty="0"/>
-              <a:t>We could see that Netflix Exclusive movies </a:t>
-            </a:r>
-            <a:r>
-              <a:rPr lang="en-US" dirty="0" smtClean="0"/>
-              <a:t>increased </a:t>
-            </a:r>
-            <a:r>
-              <a:rPr lang="en-US" dirty="0"/>
-              <a:t>slightly over the same time period but the non-exclusive movies and TV shows remained around the same or decreased.</a:t>
+              <a:t>We could see that Netflix Exclusive movies increased slightly over the same time period but the non-exclusive movies and TV shows remained around the same or decreased.</a:t>
             </a:r>
           </a:p>
           <a:p>
@@ -3773,7 +3757,7 @@
               <a:t>Throughout </a:t>
             </a:r>
             <a:r>
-              <a:rPr lang="en-US" smtClean="0"/>
+              <a:rPr lang="en-US"/>
               <a:t>the data, </a:t>
             </a:r>
             <a:r>
@@ -3883,7 +3867,7 @@
               <a:tabLst/>
             </a:pPr>
             <a:r>
-              <a:rPr kumimoji="0" lang="en-US" altLang="en-US" sz="1800" b="0" i="0" u="none" strike="noStrike" cap="none" normalizeH="0" baseline="0" dirty="0" smtClean="0">
+              <a:rPr kumimoji="0" lang="en-US" altLang="en-US" sz="1800" b="0" i="0" u="none" strike="noStrike" cap="none" normalizeH="0" baseline="0" dirty="0">
                 <a:ln>
                   <a:noFill/>
                 </a:ln>
@@ -3898,7 +3882,7 @@
               <a:t>https://www.kaggle.com/datasets/prasertk/netflix-daily-top-10-in-us</a:t>
             </a:r>
             <a:r>
-              <a:rPr kumimoji="0" lang="en-US" altLang="en-US" sz="1800" b="0" i="0" u="none" strike="noStrike" cap="none" normalizeH="0" baseline="0" dirty="0" smtClean="0">
+              <a:rPr kumimoji="0" lang="en-US" altLang="en-US" sz="1800" b="0" i="0" u="none" strike="noStrike" cap="none" normalizeH="0" baseline="0" dirty="0">
                 <a:ln>
                   <a:noFill/>
                 </a:ln>
@@ -3909,7 +3893,7 @@
               </a:rPr>
               <a:t> </a:t>
             </a:r>
-            <a:endParaRPr kumimoji="0" lang="en-US" altLang="en-US" sz="1800" b="0" i="0" u="none" strike="noStrike" cap="none" normalizeH="0" baseline="0" dirty="0" smtClean="0">
+            <a:endParaRPr kumimoji="0" lang="en-US" altLang="en-US" sz="1800" b="0" i="0" u="none" strike="noStrike" cap="none" normalizeH="0" baseline="0" dirty="0">
               <a:ln>
                 <a:noFill/>
               </a:ln>
@@ -3979,35 +3963,17 @@
             </a:pPr>
             <a:r>
               <a:rPr lang="en-US" dirty="0"/>
-              <a:t>Based on the results from the pandemic, we can see that most people preferred to watch TV </a:t>
-            </a:r>
-            <a:r>
-              <a:rPr lang="en-US" dirty="0" smtClean="0"/>
-              <a:t>shows within the United States. </a:t>
-            </a:r>
-            <a:r>
-              <a:rPr lang="en-US" dirty="0"/>
-              <a:t>This is likely to have been a result of the lockdowns and people had more time to watch TV shows. </a:t>
-            </a:r>
-            <a:endParaRPr lang="en-US" dirty="0" smtClean="0"/>
+              <a:t>Based on the results from the pandemic, we can see that most people preferred to watch TV shows within the United States. This is likely to have been a result of the lockdowns and people had more time to watch TV shows. </a:t>
+            </a:r>
           </a:p>
           <a:p>
             <a:pPr marL="342900" indent="-342900">
               <a:buAutoNum type="arabicPeriod"/>
             </a:pPr>
             <a:r>
-              <a:rPr lang="en-US" dirty="0" smtClean="0"/>
-              <a:t>The </a:t>
-            </a:r>
-            <a:r>
               <a:rPr lang="en-US" dirty="0"/>
-              <a:t>popularity of certain TV shows (example-Tiger King) resulted in more people watching specifically Netflix exclusive TV shows</a:t>
-            </a:r>
-            <a:r>
-              <a:rPr lang="en-US" dirty="0" smtClean="0"/>
-              <a:t>.</a:t>
-            </a:r>
-            <a:endParaRPr lang="en-US" dirty="0"/>
+              <a:t>The popularity of certain TV shows (example-Tiger King) resulted in more people watching specifically Netflix exclusive TV shows.</a:t>
+            </a:r>
           </a:p>
           <a:p>
             <a:pPr marL="342900" indent="-342900">
@@ -4015,21 +3981,8 @@
             </a:pPr>
             <a:r>
               <a:rPr lang="en-US" dirty="0"/>
-              <a:t>Netflix is likely capable of being able to produce TV shows at a faster rate than </a:t>
-            </a:r>
-            <a:r>
-              <a:rPr lang="en-US" dirty="0" smtClean="0"/>
-              <a:t>movies. This is likely why they are more popular as there are more options </a:t>
-            </a:r>
-            <a:r>
-              <a:rPr lang="en-US" dirty="0"/>
-              <a:t>for </a:t>
-            </a:r>
-            <a:r>
-              <a:rPr lang="en-US" dirty="0" smtClean="0"/>
-              <a:t>users.</a:t>
-            </a:r>
-            <a:endParaRPr lang="en-US" dirty="0"/>
+              <a:t>Netflix is likely capable of being able to produce TV shows at a faster rate than movies. This is likely why they are more popular as there are more options for users.</a:t>
+            </a:r>
           </a:p>
         </p:txBody>
       </p:sp>
@@ -4441,7 +4394,7 @@
               <a:tabLst/>
             </a:pPr>
             <a:r>
-              <a:rPr kumimoji="0" lang="en-US" altLang="en-US" sz="1800" b="0" i="0" u="none" strike="noStrike" cap="none" normalizeH="0" baseline="0" smtClean="0">
+              <a:rPr kumimoji="0" lang="en-US" altLang="en-US" sz="1800" b="0" i="0" u="none" strike="noStrike" cap="none" normalizeH="0" baseline="0">
                 <a:ln>
                   <a:noFill/>
                 </a:ln>
@@ -4455,7 +4408,7 @@
               </a:rPr>
               <a:t>https://www.kaggle.com/datasets/prasertk/netflix-daily-top-10-in-us</a:t>
             </a:r>
-            <a:endParaRPr kumimoji="0" lang="en-US" altLang="en-US" sz="1800" b="0" i="0" u="none" strike="noStrike" cap="none" normalizeH="0" baseline="0" smtClean="0">
+            <a:endParaRPr kumimoji="0" lang="en-US" altLang="en-US" sz="1800" b="0" i="0" u="none" strike="noStrike" cap="none" normalizeH="0" baseline="0">
               <a:ln>
                 <a:noFill/>
               </a:ln>
@@ -4482,22 +4435,8 @@
               <a:buNone/>
               <a:tabLst/>
             </a:pPr>
-            <a:r>
-              <a:rPr kumimoji="0" lang="en-US" altLang="en-US" sz="1800" b="0" i="0" u="none" strike="noStrike" cap="none" normalizeH="0" baseline="0" smtClean="0">
-                <a:ln>
-                  <a:noFill/>
-                </a:ln>
-                <a:solidFill>
-                  <a:srgbClr val="222222"/>
-                </a:solidFill>
-                <a:effectLst/>
-                <a:latin typeface="Arial" panose="020B0604020202020204" pitchFamily="34" charset="0"/>
-                <a:cs typeface="Arial" panose="020B0604020202020204" pitchFamily="34" charset="0"/>
-              </a:rPr>
-              <a:t/>
-            </a:r>
             <a:br>
-              <a:rPr kumimoji="0" lang="en-US" altLang="en-US" sz="1800" b="0" i="0" u="none" strike="noStrike" cap="none" normalizeH="0" baseline="0" smtClean="0">
+              <a:rPr kumimoji="0" lang="en-US" altLang="en-US" sz="1800" b="0" i="0" u="none" strike="noStrike" cap="none" normalizeH="0" baseline="0">
                 <a:ln>
                   <a:noFill/>
                 </a:ln>
@@ -4509,7 +4448,7 @@
                 <a:cs typeface="Arial" panose="020B0604020202020204" pitchFamily="34" charset="0"/>
               </a:rPr>
             </a:br>
-            <a:endParaRPr kumimoji="0" lang="en-US" altLang="en-US" sz="1800" b="0" i="0" u="none" strike="noStrike" cap="none" normalizeH="0" baseline="0" smtClean="0">
+            <a:endParaRPr kumimoji="0" lang="en-US" altLang="en-US" sz="1800" b="0" i="0" u="none" strike="noStrike" cap="none" normalizeH="0" baseline="0">
               <a:ln>
                 <a:noFill/>
               </a:ln>
@@ -5797,7 +5736,7 @@
               <a:buChar char="•"/>
             </a:pPr>
             <a:r>
-              <a:rPr lang="en-US" sz="2400" b="0" i="0" dirty="0">
+              <a:rPr lang="en-US" sz="2400" i="0" dirty="0">
                 <a:solidFill>
                   <a:srgbClr val="000000"/>
                 </a:solidFill>
@@ -5816,7 +5755,7 @@
               <a:t>H</a:t>
             </a:r>
             <a:r>
-              <a:rPr lang="en-US" sz="2400" b="0" i="0" dirty="0">
+              <a:rPr lang="en-US" sz="2400" i="0" dirty="0">
                 <a:solidFill>
                   <a:srgbClr val="000000"/>
                 </a:solidFill>
@@ -5854,7 +5793,7 @@
                 </a:solidFill>
                 <a:latin typeface="Helvetica Neue"/>
               </a:rPr>
-              <a:t>    2) Specific genres of movies and TV shows based on past trends?</a:t>
+              <a:t>    2) Relationship between a country and the number of movies and TV shows?</a:t>
             </a:r>
           </a:p>
           <a:p>
@@ -5865,7 +5804,7 @@
                 </a:solidFill>
                 <a:latin typeface="Helvetica Neue"/>
               </a:rPr>
-              <a:t>    3) Relationship between a country and the number of movies and TV shows?</a:t>
+              <a:t>    3) Specific genres of movies and TV shows based on past trends?</a:t>
             </a:r>
           </a:p>
           <a:p>
@@ -5876,7 +5815,11 @@
                 </a:solidFill>
                 <a:latin typeface="Helvetica Neue"/>
               </a:rPr>
-              <a:t>    4) Does is this trend consistent each country?</a:t>
+              <a:t>    4) </a:t>
+            </a:r>
+            <a:r>
+              <a:rPr lang="en-US" sz="2400" dirty="0"/>
+              <a:t>What was the popular type of entertainment on Netflix during the pandemic?</a:t>
             </a:r>
           </a:p>
           <a:p>
@@ -5887,7 +5830,11 @@
                 </a:solidFill>
                 <a:latin typeface="Helvetica Neue"/>
               </a:rPr>
-              <a:t>    5) Is it reflection of what Netflix wants to focus on?  </a:t>
+              <a:t>    5) </a:t>
+            </a:r>
+            <a:r>
+              <a:rPr lang="en-US" sz="2400" dirty="0"/>
+              <a:t>What Kind of Content Appeared in the Daily Top 10?</a:t>
             </a:r>
           </a:p>
         </p:txBody>

</xml_diff>